<commit_message>
added Google Maps api and current location
</commit_message>
<xml_diff>
--- a/powerpt_mockup.pptx
+++ b/powerpt_mockup.pptx
@@ -9,8 +9,8 @@
     <p:sldId id="261" r:id="rId3"/>
     <p:sldId id="265" r:id="rId4"/>
     <p:sldId id="259" r:id="rId5"/>
-    <p:sldId id="268" r:id="rId6"/>
-    <p:sldId id="269" r:id="rId7"/>
+    <p:sldId id="269" r:id="rId6"/>
+    <p:sldId id="268" r:id="rId7"/>
     <p:sldId id="263" r:id="rId8"/>
     <p:sldId id="257" r:id="rId9"/>
     <p:sldId id="258" r:id="rId10"/>
@@ -3115,7 +3115,7 @@
         </p:nvSpPr>
         <p:spPr>
           <a:xfrm>
-            <a:off x="0" y="0"/>
+            <a:off x="-57728" y="-65698"/>
             <a:ext cx="9144000" cy="6858000"/>
           </a:xfrm>
           <a:prstGeom prst="rect">
@@ -3229,7 +3229,12 @@
             <p:ph type="subTitle" idx="1"/>
           </p:nvPr>
         </p:nvSpPr>
-        <p:spPr/>
+        <p:spPr>
+          <a:xfrm>
+            <a:off x="1371600" y="4329544"/>
+            <a:ext cx="6400800" cy="1309255"/>
+          </a:xfrm>
+        </p:spPr>
         <p:txBody>
           <a:bodyPr/>
           <a:lstStyle/>
@@ -3288,6 +3293,129 @@
           </a:p>
         </p:txBody>
       </p:sp>
+      <p:grpSp>
+        <p:nvGrpSpPr>
+          <p:cNvPr id="9" name="Group 8"/>
+          <p:cNvGrpSpPr/>
+          <p:nvPr/>
+        </p:nvGrpSpPr>
+        <p:grpSpPr>
+          <a:xfrm>
+            <a:off x="1287632" y="3439594"/>
+            <a:ext cx="6484768" cy="830997"/>
+            <a:chOff x="823111" y="1269050"/>
+            <a:chExt cx="6484768" cy="830997"/>
+          </a:xfrm>
+        </p:grpSpPr>
+        <p:sp>
+          <p:nvSpPr>
+            <p:cNvPr id="5" name="TextBox 4"/>
+            <p:cNvSpPr txBox="1"/>
+            <p:nvPr/>
+          </p:nvSpPr>
+          <p:spPr>
+            <a:xfrm>
+              <a:off x="823111" y="1269050"/>
+              <a:ext cx="6484768" cy="830997"/>
+            </a:xfrm>
+            <a:prstGeom prst="rect">
+              <a:avLst/>
+            </a:prstGeom>
+            <a:noFill/>
+          </p:spPr>
+          <p:txBody>
+            <a:bodyPr wrap="none" rtlCol="0">
+              <a:spAutoFit/>
+              <a:scene3d>
+                <a:camera prst="orthographicFront"/>
+                <a:lightRig rig="balanced" dir="t">
+                  <a:rot lat="0" lon="0" rev="2100000"/>
+                </a:lightRig>
+              </a:scene3d>
+              <a:sp3d extrusionH="57150" prstMaterial="metal">
+                <a:bevelT w="38100" h="25400"/>
+                <a:contourClr>
+                  <a:schemeClr val="bg2"/>
+                </a:contourClr>
+              </a:sp3d>
+            </a:bodyPr>
+            <a:lstStyle/>
+            <a:p>
+              <a:r>
+                <a:rPr lang="en-US" sz="4800" b="1" dirty="0" smtClean="0">
+                  <a:ln w="50800"/>
+                  <a:solidFill>
+                    <a:srgbClr val="008000"/>
+                  </a:solidFill>
+                  <a:latin typeface="Menlo Regular"/>
+                  <a:cs typeface="Menlo Regular"/>
+                </a:rPr>
+                <a:t>High P </a:t>
+              </a:r>
+              <a:r>
+                <a:rPr lang="en-US" sz="4800" b="1" dirty="0" err="1" smtClean="0">
+                  <a:ln w="50800"/>
+                  <a:solidFill>
+                    <a:srgbClr val="008000"/>
+                  </a:solidFill>
+                  <a:latin typeface="Menlo Regular"/>
+                  <a:cs typeface="Menlo Regular"/>
+                </a:rPr>
+                <a:t>int</a:t>
+              </a:r>
+              <a:r>
+                <a:rPr lang="en-US" sz="4800" b="1" dirty="0" smtClean="0">
+                  <a:ln w="50800"/>
+                  <a:solidFill>
+                    <a:srgbClr val="008000"/>
+                  </a:solidFill>
+                  <a:latin typeface="Menlo Regular"/>
+                  <a:cs typeface="Menlo Regular"/>
+                </a:rPr>
+                <a:t> Tennis</a:t>
+              </a:r>
+              <a:endParaRPr lang="en-US" sz="4800" b="1" dirty="0">
+                <a:ln w="50800"/>
+                <a:solidFill>
+                  <a:srgbClr val="008000"/>
+                </a:solidFill>
+                <a:latin typeface="Menlo Regular"/>
+                <a:cs typeface="Menlo Regular"/>
+              </a:endParaRPr>
+            </a:p>
+          </p:txBody>
+        </p:sp>
+        <p:pic>
+          <p:nvPicPr>
+            <p:cNvPr id="7" name="Picture 6" descr="tennis_ball.png"/>
+            <p:cNvPicPr>
+              <a:picLocks noChangeAspect="1"/>
+            </p:cNvPicPr>
+            <p:nvPr/>
+          </p:nvPicPr>
+          <p:blipFill>
+            <a:blip r:embed="rId2">
+              <a:extLst>
+                <a:ext uri="{28A0092B-C50C-407E-A947-70E740481C1C}">
+                  <a14:useLocalDpi xmlns:a14="http://schemas.microsoft.com/office/drawing/2010/main" val="0"/>
+                </a:ext>
+              </a:extLst>
+            </a:blip>
+            <a:stretch>
+              <a:fillRect/>
+            </a:stretch>
+          </p:blipFill>
+          <p:spPr>
+            <a:xfrm>
+              <a:off x="3121835" y="1565074"/>
+              <a:ext cx="381612" cy="390809"/>
+            </a:xfrm>
+            <a:prstGeom prst="rect">
+              <a:avLst/>
+            </a:prstGeom>
+          </p:spPr>
+        </p:pic>
+      </p:grpSp>
     </p:spTree>
     <p:extLst>
       <p:ext uri="{BB962C8B-B14F-4D97-AF65-F5344CB8AC3E}">
@@ -22032,347 +22160,6 @@
                   </a:innerShdw>
                 </a:effectLst>
               </a:rPr>
-              <a:t>Calendar View</a:t>
-            </a:r>
-            <a:endParaRPr lang="en-US" b="1" spc="50" dirty="0">
-              <a:ln w="13500">
-                <a:solidFill>
-                  <a:schemeClr val="accent1">
-                    <a:shade val="2500"/>
-                    <a:alpha val="6500"/>
-                  </a:schemeClr>
-                </a:solidFill>
-                <a:prstDash val="solid"/>
-              </a:ln>
-              <a:solidFill>
-                <a:schemeClr val="accent1">
-                  <a:tint val="3000"/>
-                  <a:alpha val="95000"/>
-                </a:schemeClr>
-              </a:solidFill>
-              <a:effectLst>
-                <a:innerShdw blurRad="50900" dist="38500" dir="13500000">
-                  <a:srgbClr val="000000">
-                    <a:alpha val="60000"/>
-                  </a:srgbClr>
-                </a:innerShdw>
-              </a:effectLst>
-            </a:endParaRPr>
-          </a:p>
-        </p:txBody>
-      </p:sp>
-      <p:grpSp>
-        <p:nvGrpSpPr>
-          <p:cNvPr id="2" name="Group 1"/>
-          <p:cNvGrpSpPr/>
-          <p:nvPr/>
-        </p:nvGrpSpPr>
-        <p:grpSpPr>
-          <a:xfrm>
-            <a:off x="549560" y="1373691"/>
-            <a:ext cx="6897255" cy="4849303"/>
-            <a:chOff x="445655" y="657877"/>
-            <a:chExt cx="6897255" cy="4849303"/>
-          </a:xfrm>
-        </p:grpSpPr>
-        <p:sp>
-          <p:nvSpPr>
-            <p:cNvPr id="4" name="Rectangle 3"/>
-            <p:cNvSpPr/>
-            <p:nvPr/>
-          </p:nvSpPr>
-          <p:spPr>
-            <a:xfrm>
-              <a:off x="5135560" y="2444757"/>
-              <a:ext cx="1508125" cy="317500"/>
-            </a:xfrm>
-            <a:prstGeom prst="rect">
-              <a:avLst/>
-            </a:prstGeom>
-            <a:solidFill>
-              <a:schemeClr val="bg1"/>
-            </a:solidFill>
-            <a:ln>
-              <a:noFill/>
-            </a:ln>
-            <a:effectLst/>
-          </p:spPr>
-          <p:style>
-            <a:lnRef idx="1">
-              <a:schemeClr val="accent1"/>
-            </a:lnRef>
-            <a:fillRef idx="3">
-              <a:schemeClr val="accent1"/>
-            </a:fillRef>
-            <a:effectRef idx="2">
-              <a:schemeClr val="accent1"/>
-            </a:effectRef>
-            <a:fontRef idx="minor">
-              <a:schemeClr val="lt1"/>
-            </a:fontRef>
-          </p:style>
-          <p:txBody>
-            <a:bodyPr rtlCol="0" anchor="ctr"/>
-            <a:lstStyle/>
-            <a:p>
-              <a:pPr algn="ctr"/>
-              <a:endParaRPr lang="en-US"/>
-            </a:p>
-          </p:txBody>
-        </p:sp>
-        <p:pic>
-          <p:nvPicPr>
-            <p:cNvPr id="13" name="Picture 12" descr="desk_calendar.png"/>
-            <p:cNvPicPr>
-              <a:picLocks noChangeAspect="1"/>
-            </p:cNvPicPr>
-            <p:nvPr/>
-          </p:nvPicPr>
-          <p:blipFill>
-            <a:blip r:embed="rId2">
-              <a:extLst>
-                <a:ext uri="{28A0092B-C50C-407E-A947-70E740481C1C}">
-                  <a14:useLocalDpi xmlns:a14="http://schemas.microsoft.com/office/drawing/2010/main" val="0"/>
-                </a:ext>
-              </a:extLst>
-            </a:blip>
-            <a:stretch>
-              <a:fillRect/>
-            </a:stretch>
-          </p:blipFill>
-          <p:spPr>
-            <a:xfrm>
-              <a:off x="542637" y="657877"/>
-              <a:ext cx="6661720" cy="4668335"/>
-            </a:xfrm>
-            <a:prstGeom prst="rect">
-              <a:avLst/>
-            </a:prstGeom>
-          </p:spPr>
-        </p:pic>
-        <p:pic>
-          <p:nvPicPr>
-            <p:cNvPr id="7" name="Picture 6" descr="monitor.png"/>
-            <p:cNvPicPr>
-              <a:picLocks noChangeAspect="1"/>
-            </p:cNvPicPr>
-            <p:nvPr/>
-          </p:nvPicPr>
-          <p:blipFill>
-            <a:blip r:embed="rId3">
-              <a:extLst>
-                <a:ext uri="{28A0092B-C50C-407E-A947-70E740481C1C}">
-                  <a14:useLocalDpi xmlns:a14="http://schemas.microsoft.com/office/drawing/2010/main" val="0"/>
-                </a:ext>
-              </a:extLst>
-            </a:blip>
-            <a:stretch>
-              <a:fillRect/>
-            </a:stretch>
-          </p:blipFill>
-          <p:spPr>
-            <a:xfrm>
-              <a:off x="445655" y="659991"/>
-              <a:ext cx="6897255" cy="4847189"/>
-            </a:xfrm>
-            <a:prstGeom prst="rect">
-              <a:avLst/>
-            </a:prstGeom>
-          </p:spPr>
-        </p:pic>
-      </p:grpSp>
-      <p:grpSp>
-        <p:nvGrpSpPr>
-          <p:cNvPr id="6" name="Group 5"/>
-          <p:cNvGrpSpPr/>
-          <p:nvPr/>
-        </p:nvGrpSpPr>
-        <p:grpSpPr>
-          <a:xfrm>
-            <a:off x="6496584" y="2451965"/>
-            <a:ext cx="2294121" cy="4216970"/>
-            <a:chOff x="7404060" y="782212"/>
-            <a:chExt cx="2294121" cy="4216970"/>
-          </a:xfrm>
-        </p:grpSpPr>
-        <p:pic>
-          <p:nvPicPr>
-            <p:cNvPr id="14" name="Picture 13" descr="desk_calendar.png"/>
-            <p:cNvPicPr>
-              <a:picLocks noChangeAspect="1"/>
-            </p:cNvPicPr>
-            <p:nvPr/>
-          </p:nvPicPr>
-          <p:blipFill rotWithShape="1">
-            <a:blip r:embed="rId2">
-              <a:extLst>
-                <a:ext uri="{28A0092B-C50C-407E-A947-70E740481C1C}">
-                  <a14:useLocalDpi xmlns:a14="http://schemas.microsoft.com/office/drawing/2010/main" val="0"/>
-                </a:ext>
-              </a:extLst>
-            </a:blip>
-            <a:srcRect l="59793" t="4730" b="9789"/>
-            <a:stretch/>
-          </p:blipFill>
-          <p:spPr>
-            <a:xfrm>
-              <a:off x="7656631" y="1431636"/>
-              <a:ext cx="1769078" cy="3013364"/>
-            </a:xfrm>
-            <a:prstGeom prst="rect">
-              <a:avLst/>
-            </a:prstGeom>
-          </p:spPr>
-        </p:pic>
-        <p:pic>
-          <p:nvPicPr>
-            <p:cNvPr id="11" name="Picture 10" descr="mobile_template.png"/>
-            <p:cNvPicPr>
-              <a:picLocks noChangeAspect="1"/>
-            </p:cNvPicPr>
-            <p:nvPr/>
-          </p:nvPicPr>
-          <p:blipFill>
-            <a:blip r:embed="rId4">
-              <a:extLst>
-                <a:ext uri="{28A0092B-C50C-407E-A947-70E740481C1C}">
-                  <a14:useLocalDpi xmlns:a14="http://schemas.microsoft.com/office/drawing/2010/main" val="0"/>
-                </a:ext>
-              </a:extLst>
-            </a:blip>
-            <a:stretch>
-              <a:fillRect/>
-            </a:stretch>
-          </p:blipFill>
-          <p:spPr>
-            <a:xfrm>
-              <a:off x="7404060" y="782212"/>
-              <a:ext cx="2294121" cy="4216970"/>
-            </a:xfrm>
-            <a:prstGeom prst="rect">
-              <a:avLst/>
-            </a:prstGeom>
-          </p:spPr>
-        </p:pic>
-      </p:grpSp>
-    </p:spTree>
-    <p:extLst>
-      <p:ext uri="{BB962C8B-B14F-4D97-AF65-F5344CB8AC3E}">
-        <p14:creationId xmlns:p14="http://schemas.microsoft.com/office/powerpoint/2010/main" val="1948039143"/>
-      </p:ext>
-    </p:extLst>
-  </p:cSld>
-  <p:clrMapOvr>
-    <a:masterClrMapping/>
-  </p:clrMapOvr>
-</p:sld>
-</file>
-
-<file path=ppt/slides/slide6.xml><?xml version="1.0" encoding="utf-8"?>
-<p:sld xmlns:a="http://schemas.openxmlformats.org/drawingml/2006/main" xmlns:r="http://schemas.openxmlformats.org/officeDocument/2006/relationships" xmlns:p="http://schemas.openxmlformats.org/presentationml/2006/main">
-  <p:cSld>
-    <p:spTree>
-      <p:nvGrpSpPr>
-        <p:cNvPr id="1" name=""/>
-        <p:cNvGrpSpPr/>
-        <p:nvPr/>
-      </p:nvGrpSpPr>
-      <p:grpSpPr>
-        <a:xfrm>
-          <a:off x="0" y="0"/>
-          <a:ext cx="0" cy="0"/>
-          <a:chOff x="0" y="0"/>
-          <a:chExt cx="0" cy="0"/>
-        </a:xfrm>
-      </p:grpSpPr>
-      <p:sp>
-        <p:nvSpPr>
-          <p:cNvPr id="15" name="Rectangle 14"/>
-          <p:cNvSpPr/>
-          <p:nvPr/>
-        </p:nvSpPr>
-        <p:spPr>
-          <a:xfrm>
-            <a:off x="0" y="0"/>
-            <a:ext cx="9144000" cy="6858000"/>
-          </a:xfrm>
-          <a:prstGeom prst="rect">
-            <a:avLst/>
-          </a:prstGeom>
-          <a:ln>
-            <a:noFill/>
-          </a:ln>
-        </p:spPr>
-        <p:style>
-          <a:lnRef idx="1">
-            <a:schemeClr val="accent1"/>
-          </a:lnRef>
-          <a:fillRef idx="3">
-            <a:schemeClr val="accent1"/>
-          </a:fillRef>
-          <a:effectRef idx="2">
-            <a:schemeClr val="accent1"/>
-          </a:effectRef>
-          <a:fontRef idx="minor">
-            <a:schemeClr val="lt1"/>
-          </a:fontRef>
-        </p:style>
-        <p:txBody>
-          <a:bodyPr rtlCol="0" anchor="ctr"/>
-          <a:lstStyle/>
-          <a:p>
-            <a:pPr algn="ctr"/>
-            <a:endParaRPr lang="en-US" sz="4400" dirty="0"/>
-          </a:p>
-        </p:txBody>
-      </p:sp>
-      <p:sp>
-        <p:nvSpPr>
-          <p:cNvPr id="3" name="Title 1"/>
-          <p:cNvSpPr>
-            <a:spLocks noGrp="1"/>
-          </p:cNvSpPr>
-          <p:nvPr>
-            <p:ph type="title"/>
-          </p:nvPr>
-        </p:nvSpPr>
-        <p:spPr>
-          <a:xfrm>
-            <a:off x="457200" y="79572"/>
-            <a:ext cx="8229600" cy="578306"/>
-          </a:xfrm>
-        </p:spPr>
-        <p:txBody>
-          <a:bodyPr>
-            <a:noAutofit/>
-          </a:bodyPr>
-          <a:lstStyle/>
-          <a:p>
-            <a:r>
-              <a:rPr lang="en-US" b="1" spc="50" dirty="0" smtClean="0">
-                <a:ln w="13500">
-                  <a:solidFill>
-                    <a:schemeClr val="accent1">
-                      <a:shade val="2500"/>
-                      <a:alpha val="6500"/>
-                    </a:schemeClr>
-                  </a:solidFill>
-                  <a:prstDash val="solid"/>
-                </a:ln>
-                <a:solidFill>
-                  <a:schemeClr val="accent1">
-                    <a:tint val="3000"/>
-                    <a:alpha val="95000"/>
-                  </a:schemeClr>
-                </a:solidFill>
-                <a:effectLst>
-                  <a:innerShdw blurRad="50900" dist="38500" dir="13500000">
-                    <a:srgbClr val="000000">
-                      <a:alpha val="60000"/>
-                    </a:srgbClr>
-                  </a:innerShdw>
-                </a:effectLst>
-              </a:rPr>
               <a:t>Location </a:t>
             </a:r>
             <a:r>
@@ -22652,6 +22439,347 @@
     <p:extLst>
       <p:ext uri="{BB962C8B-B14F-4D97-AF65-F5344CB8AC3E}">
         <p14:creationId xmlns:p14="http://schemas.microsoft.com/office/powerpoint/2010/main" val="21224342"/>
+      </p:ext>
+    </p:extLst>
+  </p:cSld>
+  <p:clrMapOvr>
+    <a:masterClrMapping/>
+  </p:clrMapOvr>
+</p:sld>
+</file>
+
+<file path=ppt/slides/slide6.xml><?xml version="1.0" encoding="utf-8"?>
+<p:sld xmlns:a="http://schemas.openxmlformats.org/drawingml/2006/main" xmlns:r="http://schemas.openxmlformats.org/officeDocument/2006/relationships" xmlns:p="http://schemas.openxmlformats.org/presentationml/2006/main">
+  <p:cSld>
+    <p:spTree>
+      <p:nvGrpSpPr>
+        <p:cNvPr id="1" name=""/>
+        <p:cNvGrpSpPr/>
+        <p:nvPr/>
+      </p:nvGrpSpPr>
+      <p:grpSpPr>
+        <a:xfrm>
+          <a:off x="0" y="0"/>
+          <a:ext cx="0" cy="0"/>
+          <a:chOff x="0" y="0"/>
+          <a:chExt cx="0" cy="0"/>
+        </a:xfrm>
+      </p:grpSpPr>
+      <p:sp>
+        <p:nvSpPr>
+          <p:cNvPr id="15" name="Rectangle 14"/>
+          <p:cNvSpPr/>
+          <p:nvPr/>
+        </p:nvSpPr>
+        <p:spPr>
+          <a:xfrm>
+            <a:off x="0" y="0"/>
+            <a:ext cx="9144000" cy="6858000"/>
+          </a:xfrm>
+          <a:prstGeom prst="rect">
+            <a:avLst/>
+          </a:prstGeom>
+          <a:ln>
+            <a:noFill/>
+          </a:ln>
+        </p:spPr>
+        <p:style>
+          <a:lnRef idx="1">
+            <a:schemeClr val="accent1"/>
+          </a:lnRef>
+          <a:fillRef idx="3">
+            <a:schemeClr val="accent1"/>
+          </a:fillRef>
+          <a:effectRef idx="2">
+            <a:schemeClr val="accent1"/>
+          </a:effectRef>
+          <a:fontRef idx="minor">
+            <a:schemeClr val="lt1"/>
+          </a:fontRef>
+        </p:style>
+        <p:txBody>
+          <a:bodyPr rtlCol="0" anchor="ctr"/>
+          <a:lstStyle/>
+          <a:p>
+            <a:pPr algn="ctr"/>
+            <a:endParaRPr lang="en-US" sz="4400" dirty="0"/>
+          </a:p>
+        </p:txBody>
+      </p:sp>
+      <p:sp>
+        <p:nvSpPr>
+          <p:cNvPr id="3" name="Title 1"/>
+          <p:cNvSpPr>
+            <a:spLocks noGrp="1"/>
+          </p:cNvSpPr>
+          <p:nvPr>
+            <p:ph type="title"/>
+          </p:nvPr>
+        </p:nvSpPr>
+        <p:spPr>
+          <a:xfrm>
+            <a:off x="457200" y="79572"/>
+            <a:ext cx="8229600" cy="578306"/>
+          </a:xfrm>
+        </p:spPr>
+        <p:txBody>
+          <a:bodyPr>
+            <a:noAutofit/>
+          </a:bodyPr>
+          <a:lstStyle/>
+          <a:p>
+            <a:r>
+              <a:rPr lang="en-US" b="1" spc="50" dirty="0" smtClean="0">
+                <a:ln w="13500">
+                  <a:solidFill>
+                    <a:schemeClr val="accent1">
+                      <a:shade val="2500"/>
+                      <a:alpha val="6500"/>
+                    </a:schemeClr>
+                  </a:solidFill>
+                  <a:prstDash val="solid"/>
+                </a:ln>
+                <a:solidFill>
+                  <a:schemeClr val="accent1">
+                    <a:tint val="3000"/>
+                    <a:alpha val="95000"/>
+                  </a:schemeClr>
+                </a:solidFill>
+                <a:effectLst>
+                  <a:innerShdw blurRad="50900" dist="38500" dir="13500000">
+                    <a:srgbClr val="000000">
+                      <a:alpha val="60000"/>
+                    </a:srgbClr>
+                  </a:innerShdw>
+                </a:effectLst>
+              </a:rPr>
+              <a:t>Calendar View</a:t>
+            </a:r>
+            <a:endParaRPr lang="en-US" b="1" spc="50" dirty="0">
+              <a:ln w="13500">
+                <a:solidFill>
+                  <a:schemeClr val="accent1">
+                    <a:shade val="2500"/>
+                    <a:alpha val="6500"/>
+                  </a:schemeClr>
+                </a:solidFill>
+                <a:prstDash val="solid"/>
+              </a:ln>
+              <a:solidFill>
+                <a:schemeClr val="accent1">
+                  <a:tint val="3000"/>
+                  <a:alpha val="95000"/>
+                </a:schemeClr>
+              </a:solidFill>
+              <a:effectLst>
+                <a:innerShdw blurRad="50900" dist="38500" dir="13500000">
+                  <a:srgbClr val="000000">
+                    <a:alpha val="60000"/>
+                  </a:srgbClr>
+                </a:innerShdw>
+              </a:effectLst>
+            </a:endParaRPr>
+          </a:p>
+        </p:txBody>
+      </p:sp>
+      <p:grpSp>
+        <p:nvGrpSpPr>
+          <p:cNvPr id="2" name="Group 1"/>
+          <p:cNvGrpSpPr/>
+          <p:nvPr/>
+        </p:nvGrpSpPr>
+        <p:grpSpPr>
+          <a:xfrm>
+            <a:off x="549560" y="1373691"/>
+            <a:ext cx="6897255" cy="4849303"/>
+            <a:chOff x="445655" y="657877"/>
+            <a:chExt cx="6897255" cy="4849303"/>
+          </a:xfrm>
+        </p:grpSpPr>
+        <p:sp>
+          <p:nvSpPr>
+            <p:cNvPr id="4" name="Rectangle 3"/>
+            <p:cNvSpPr/>
+            <p:nvPr/>
+          </p:nvSpPr>
+          <p:spPr>
+            <a:xfrm>
+              <a:off x="5135560" y="2444757"/>
+              <a:ext cx="1508125" cy="317500"/>
+            </a:xfrm>
+            <a:prstGeom prst="rect">
+              <a:avLst/>
+            </a:prstGeom>
+            <a:solidFill>
+              <a:schemeClr val="bg1"/>
+            </a:solidFill>
+            <a:ln>
+              <a:noFill/>
+            </a:ln>
+            <a:effectLst/>
+          </p:spPr>
+          <p:style>
+            <a:lnRef idx="1">
+              <a:schemeClr val="accent1"/>
+            </a:lnRef>
+            <a:fillRef idx="3">
+              <a:schemeClr val="accent1"/>
+            </a:fillRef>
+            <a:effectRef idx="2">
+              <a:schemeClr val="accent1"/>
+            </a:effectRef>
+            <a:fontRef idx="minor">
+              <a:schemeClr val="lt1"/>
+            </a:fontRef>
+          </p:style>
+          <p:txBody>
+            <a:bodyPr rtlCol="0" anchor="ctr"/>
+            <a:lstStyle/>
+            <a:p>
+              <a:pPr algn="ctr"/>
+              <a:endParaRPr lang="en-US"/>
+            </a:p>
+          </p:txBody>
+        </p:sp>
+        <p:pic>
+          <p:nvPicPr>
+            <p:cNvPr id="13" name="Picture 12" descr="desk_calendar.png"/>
+            <p:cNvPicPr>
+              <a:picLocks noChangeAspect="1"/>
+            </p:cNvPicPr>
+            <p:nvPr/>
+          </p:nvPicPr>
+          <p:blipFill>
+            <a:blip r:embed="rId2">
+              <a:extLst>
+                <a:ext uri="{28A0092B-C50C-407E-A947-70E740481C1C}">
+                  <a14:useLocalDpi xmlns:a14="http://schemas.microsoft.com/office/drawing/2010/main" val="0"/>
+                </a:ext>
+              </a:extLst>
+            </a:blip>
+            <a:stretch>
+              <a:fillRect/>
+            </a:stretch>
+          </p:blipFill>
+          <p:spPr>
+            <a:xfrm>
+              <a:off x="542637" y="657877"/>
+              <a:ext cx="6661720" cy="4668335"/>
+            </a:xfrm>
+            <a:prstGeom prst="rect">
+              <a:avLst/>
+            </a:prstGeom>
+          </p:spPr>
+        </p:pic>
+        <p:pic>
+          <p:nvPicPr>
+            <p:cNvPr id="7" name="Picture 6" descr="monitor.png"/>
+            <p:cNvPicPr>
+              <a:picLocks noChangeAspect="1"/>
+            </p:cNvPicPr>
+            <p:nvPr/>
+          </p:nvPicPr>
+          <p:blipFill>
+            <a:blip r:embed="rId3">
+              <a:extLst>
+                <a:ext uri="{28A0092B-C50C-407E-A947-70E740481C1C}">
+                  <a14:useLocalDpi xmlns:a14="http://schemas.microsoft.com/office/drawing/2010/main" val="0"/>
+                </a:ext>
+              </a:extLst>
+            </a:blip>
+            <a:stretch>
+              <a:fillRect/>
+            </a:stretch>
+          </p:blipFill>
+          <p:spPr>
+            <a:xfrm>
+              <a:off x="445655" y="659991"/>
+              <a:ext cx="6897255" cy="4847189"/>
+            </a:xfrm>
+            <a:prstGeom prst="rect">
+              <a:avLst/>
+            </a:prstGeom>
+          </p:spPr>
+        </p:pic>
+      </p:grpSp>
+      <p:grpSp>
+        <p:nvGrpSpPr>
+          <p:cNvPr id="6" name="Group 5"/>
+          <p:cNvGrpSpPr/>
+          <p:nvPr/>
+        </p:nvGrpSpPr>
+        <p:grpSpPr>
+          <a:xfrm>
+            <a:off x="6496584" y="2451965"/>
+            <a:ext cx="2294121" cy="4216970"/>
+            <a:chOff x="7404060" y="782212"/>
+            <a:chExt cx="2294121" cy="4216970"/>
+          </a:xfrm>
+        </p:grpSpPr>
+        <p:pic>
+          <p:nvPicPr>
+            <p:cNvPr id="14" name="Picture 13" descr="desk_calendar.png"/>
+            <p:cNvPicPr>
+              <a:picLocks noChangeAspect="1"/>
+            </p:cNvPicPr>
+            <p:nvPr/>
+          </p:nvPicPr>
+          <p:blipFill rotWithShape="1">
+            <a:blip r:embed="rId2">
+              <a:extLst>
+                <a:ext uri="{28A0092B-C50C-407E-A947-70E740481C1C}">
+                  <a14:useLocalDpi xmlns:a14="http://schemas.microsoft.com/office/drawing/2010/main" val="0"/>
+                </a:ext>
+              </a:extLst>
+            </a:blip>
+            <a:srcRect l="59793" t="4730" b="9789"/>
+            <a:stretch/>
+          </p:blipFill>
+          <p:spPr>
+            <a:xfrm>
+              <a:off x="7656631" y="1431636"/>
+              <a:ext cx="1769078" cy="3013364"/>
+            </a:xfrm>
+            <a:prstGeom prst="rect">
+              <a:avLst/>
+            </a:prstGeom>
+          </p:spPr>
+        </p:pic>
+        <p:pic>
+          <p:nvPicPr>
+            <p:cNvPr id="11" name="Picture 10" descr="mobile_template.png"/>
+            <p:cNvPicPr>
+              <a:picLocks noChangeAspect="1"/>
+            </p:cNvPicPr>
+            <p:nvPr/>
+          </p:nvPicPr>
+          <p:blipFill>
+            <a:blip r:embed="rId4">
+              <a:extLst>
+                <a:ext uri="{28A0092B-C50C-407E-A947-70E740481C1C}">
+                  <a14:useLocalDpi xmlns:a14="http://schemas.microsoft.com/office/drawing/2010/main" val="0"/>
+                </a:ext>
+              </a:extLst>
+            </a:blip>
+            <a:stretch>
+              <a:fillRect/>
+            </a:stretch>
+          </p:blipFill>
+          <p:spPr>
+            <a:xfrm>
+              <a:off x="7404060" y="782212"/>
+              <a:ext cx="2294121" cy="4216970"/>
+            </a:xfrm>
+            <a:prstGeom prst="rect">
+              <a:avLst/>
+            </a:prstGeom>
+          </p:spPr>
+        </p:pic>
+      </p:grpSp>
+    </p:spTree>
+    <p:extLst>
+      <p:ext uri="{BB962C8B-B14F-4D97-AF65-F5344CB8AC3E}">
+        <p14:creationId xmlns:p14="http://schemas.microsoft.com/office/powerpoint/2010/main" val="1948039143"/>
       </p:ext>
     </p:extLst>
   </p:cSld>

</xml_diff>

<commit_message>
updated powerpoint mockup doc
</commit_message>
<xml_diff>
--- a/powerpt_mockup.pptx
+++ b/powerpt_mockup.pptx
@@ -22109,7 +22109,11 @@
           <a:lstStyle/>
           <a:p>
             <a:pPr algn="ctr"/>
-            <a:endParaRPr lang="en-US" sz="4400" dirty="0"/>
+            <a:endParaRPr lang="en-US" sz="4400" dirty="0">
+              <a:solidFill>
+                <a:srgbClr val="3366FF"/>
+              </a:solidFill>
+            </a:endParaRPr>
           </a:p>
         </p:txBody>
       </p:sp>
@@ -22125,7 +22129,7 @@
         </p:nvSpPr>
         <p:spPr>
           <a:xfrm>
-            <a:off x="457200" y="79572"/>
+            <a:off x="457200" y="127052"/>
             <a:ext cx="8229600" cy="578306"/>
           </a:xfrm>
         </p:spPr>
@@ -22147,10 +22151,9 @@
                   <a:prstDash val="solid"/>
                 </a:ln>
                 <a:solidFill>
-                  <a:schemeClr val="accent1">
-                    <a:tint val="3000"/>
+                  <a:srgbClr val="3366FF">
                     <a:alpha val="95000"/>
-                  </a:schemeClr>
+                  </a:srgbClr>
                 </a:solidFill>
                 <a:effectLst>
                   <a:innerShdw blurRad="50900" dist="38500" dir="13500000">
@@ -22160,7 +22163,7 @@
                   </a:innerShdw>
                 </a:effectLst>
               </a:rPr>
-              <a:t>Location View</a:t>
+              <a:t>Match Location Search</a:t>
             </a:r>
             <a:endParaRPr lang="en-US" b="1" spc="50" dirty="0">
               <a:ln w="13500">
@@ -22173,10 +22176,9 @@
                 <a:prstDash val="solid"/>
               </a:ln>
               <a:solidFill>
-                <a:schemeClr val="accent1">
-                  <a:tint val="3000"/>
+                <a:srgbClr val="3366FF">
                   <a:alpha val="95000"/>
-                </a:schemeClr>
+                </a:srgbClr>
               </a:solidFill>
               <a:effectLst>
                 <a:innerShdw blurRad="50900" dist="38500" dir="13500000">
@@ -22197,7 +22199,7 @@
         </p:nvSpPr>
         <p:spPr>
           <a:xfrm>
-            <a:off x="351408" y="1033321"/>
+            <a:off x="870505" y="1185110"/>
             <a:ext cx="6610501" cy="4577770"/>
           </a:xfrm>
           <a:prstGeom prst="rect">
@@ -22236,22 +22238,21 @@
       </p:sp>
       <p:pic>
         <p:nvPicPr>
-          <p:cNvPr id="2" name="Picture 1"/>
+          <p:cNvPr id="17" name="Picture 16"/>
           <p:cNvPicPr>
             <a:picLocks noChangeAspect="1"/>
           </p:cNvPicPr>
           <p:nvPr/>
         </p:nvPicPr>
-        <p:blipFill>
+        <p:blipFill rotWithShape="1">
           <a:blip r:embed="rId2"/>
-          <a:stretch>
-            <a:fillRect/>
-          </a:stretch>
+          <a:srcRect l="13101" r="8966"/>
+          <a:stretch/>
         </p:blipFill>
         <p:spPr>
           <a:xfrm>
-            <a:off x="351408" y="1033321"/>
-            <a:ext cx="6696702" cy="4577770"/>
+            <a:off x="911673" y="1185110"/>
+            <a:ext cx="6523182" cy="4577770"/>
           </a:xfrm>
           <a:prstGeom prst="rect">
             <a:avLst/>
@@ -22280,113 +22281,127 @@
         </p:blipFill>
         <p:spPr>
           <a:xfrm>
-            <a:off x="231338" y="874571"/>
-            <a:ext cx="6897255" cy="4847189"/>
+            <a:off x="727340" y="947997"/>
+            <a:ext cx="6897255" cy="5011158"/>
           </a:xfrm>
           <a:prstGeom prst="rect">
             <a:avLst/>
           </a:prstGeom>
         </p:spPr>
       </p:pic>
-      <p:sp>
-        <p:nvSpPr>
-          <p:cNvPr id="19" name="Rectangle 18"/>
-          <p:cNvSpPr/>
+      <p:grpSp>
+        <p:nvGrpSpPr>
+          <p:cNvPr id="13" name="Group 12"/>
+          <p:cNvGrpSpPr/>
           <p:nvPr/>
-        </p:nvSpPr>
-        <p:spPr>
+        </p:nvGrpSpPr>
+        <p:grpSpPr>
           <a:xfrm>
-            <a:off x="6500090" y="3000421"/>
-            <a:ext cx="1778000" cy="3218246"/>
+            <a:off x="6299327" y="2216829"/>
+            <a:ext cx="2382424" cy="4377339"/>
+            <a:chOff x="6195850" y="2446025"/>
+            <a:chExt cx="2382424" cy="4377339"/>
           </a:xfrm>
-          <a:prstGeom prst="rect">
-            <a:avLst/>
-          </a:prstGeom>
-          <a:solidFill>
-            <a:schemeClr val="bg1"/>
-          </a:solidFill>
-          <a:ln>
-            <a:noFill/>
-          </a:ln>
-          <a:effectLst/>
-        </p:spPr>
-        <p:style>
-          <a:lnRef idx="1">
-            <a:schemeClr val="accent1"/>
-          </a:lnRef>
-          <a:fillRef idx="3">
-            <a:schemeClr val="accent1"/>
-          </a:fillRef>
-          <a:effectRef idx="2">
-            <a:schemeClr val="accent1"/>
-          </a:effectRef>
-          <a:fontRef idx="minor">
-            <a:schemeClr val="lt1"/>
-          </a:fontRef>
-        </p:style>
-        <p:txBody>
-          <a:bodyPr rtlCol="0" anchor="ctr"/>
-          <a:lstStyle/>
-          <a:p>
-            <a:pPr algn="ctr"/>
-            <a:endParaRPr lang="en-US"/>
-          </a:p>
-        </p:txBody>
-      </p:sp>
-      <p:pic>
-        <p:nvPicPr>
-          <p:cNvPr id="6" name="Picture 5"/>
-          <p:cNvPicPr>
-            <a:picLocks noChangeAspect="1"/>
-          </p:cNvPicPr>
-          <p:nvPr/>
-        </p:nvPicPr>
-        <p:blipFill>
-          <a:blip r:embed="rId4"/>
-          <a:stretch>
-            <a:fillRect/>
-          </a:stretch>
-        </p:blipFill>
-        <p:spPr>
-          <a:xfrm>
-            <a:off x="6500091" y="3104330"/>
-            <a:ext cx="1778000" cy="2955979"/>
-          </a:xfrm>
-          <a:prstGeom prst="rect">
-            <a:avLst/>
-          </a:prstGeom>
-        </p:spPr>
-      </p:pic>
-      <p:pic>
-        <p:nvPicPr>
-          <p:cNvPr id="11" name="Picture 10" descr="mobile_template.png"/>
-          <p:cNvPicPr>
-            <a:picLocks noChangeAspect="1"/>
-          </p:cNvPicPr>
-          <p:nvPr/>
-        </p:nvPicPr>
-        <p:blipFill>
-          <a:blip r:embed="rId5">
-            <a:extLst>
-              <a:ext uri="{28A0092B-C50C-407E-A947-70E740481C1C}">
-                <a14:useLocalDpi xmlns:a14="http://schemas.microsoft.com/office/drawing/2010/main" val="0"/>
-              </a:ext>
-            </a:extLst>
-          </a:blip>
-          <a:stretch>
-            <a:fillRect/>
-          </a:stretch>
-        </p:blipFill>
-        <p:spPr>
-          <a:xfrm>
-            <a:off x="6262254" y="2366606"/>
-            <a:ext cx="2294121" cy="4216970"/>
-          </a:xfrm>
-          <a:prstGeom prst="rect">
-            <a:avLst/>
-          </a:prstGeom>
-        </p:spPr>
-      </p:pic>
+        </p:grpSpPr>
+        <p:sp>
+          <p:nvSpPr>
+            <p:cNvPr id="19" name="Rectangle 18"/>
+            <p:cNvSpPr/>
+            <p:nvPr/>
+          </p:nvSpPr>
+          <p:spPr>
+            <a:xfrm>
+              <a:off x="6500090" y="3000420"/>
+              <a:ext cx="1778000" cy="3430397"/>
+            </a:xfrm>
+            <a:prstGeom prst="rect">
+              <a:avLst/>
+            </a:prstGeom>
+            <a:solidFill>
+              <a:schemeClr val="bg1"/>
+            </a:solidFill>
+            <a:ln>
+              <a:noFill/>
+            </a:ln>
+            <a:effectLst/>
+          </p:spPr>
+          <p:style>
+            <a:lnRef idx="1">
+              <a:schemeClr val="accent1"/>
+            </a:lnRef>
+            <a:fillRef idx="3">
+              <a:schemeClr val="accent1"/>
+            </a:fillRef>
+            <a:effectRef idx="2">
+              <a:schemeClr val="accent1"/>
+            </a:effectRef>
+            <a:fontRef idx="minor">
+              <a:schemeClr val="lt1"/>
+            </a:fontRef>
+          </p:style>
+          <p:txBody>
+            <a:bodyPr rtlCol="0" anchor="ctr"/>
+            <a:lstStyle/>
+            <a:p>
+              <a:pPr algn="ctr"/>
+              <a:endParaRPr lang="en-US"/>
+            </a:p>
+          </p:txBody>
+        </p:sp>
+        <p:pic>
+          <p:nvPicPr>
+            <p:cNvPr id="12" name="Picture 11"/>
+            <p:cNvPicPr>
+              <a:picLocks noChangeAspect="1"/>
+            </p:cNvPicPr>
+            <p:nvPr/>
+          </p:nvPicPr>
+          <p:blipFill rotWithShape="1">
+            <a:blip r:embed="rId4"/>
+            <a:srcRect b="6751"/>
+            <a:stretch/>
+          </p:blipFill>
+          <p:spPr>
+            <a:xfrm>
+              <a:off x="6488545" y="3177936"/>
+              <a:ext cx="1778000" cy="3218246"/>
+            </a:xfrm>
+            <a:prstGeom prst="rect">
+              <a:avLst/>
+            </a:prstGeom>
+          </p:spPr>
+        </p:pic>
+        <p:pic>
+          <p:nvPicPr>
+            <p:cNvPr id="11" name="Picture 10" descr="mobile_template.png"/>
+            <p:cNvPicPr>
+              <a:picLocks noChangeAspect="1"/>
+            </p:cNvPicPr>
+            <p:nvPr/>
+          </p:nvPicPr>
+          <p:blipFill>
+            <a:blip r:embed="rId5">
+              <a:extLst>
+                <a:ext uri="{28A0092B-C50C-407E-A947-70E740481C1C}">
+                  <a14:useLocalDpi xmlns:a14="http://schemas.microsoft.com/office/drawing/2010/main" val="0"/>
+                </a:ext>
+              </a:extLst>
+            </a:blip>
+            <a:stretch>
+              <a:fillRect/>
+            </a:stretch>
+          </p:blipFill>
+          <p:spPr>
+            <a:xfrm>
+              <a:off x="6195850" y="2446025"/>
+              <a:ext cx="2382424" cy="4377339"/>
+            </a:xfrm>
+            <a:prstGeom prst="rect">
+              <a:avLst/>
+            </a:prstGeom>
+          </p:spPr>
+        </p:pic>
+      </p:grpSp>
     </p:spTree>
     <p:extLst>
       <p:ext uri="{BB962C8B-B14F-4D97-AF65-F5344CB8AC3E}">

</xml_diff>

<commit_message>
Saving mockup and input template
</commit_message>
<xml_diff>
--- a/powerpt_mockup.pptx
+++ b/powerpt_mockup.pptx
@@ -300,7 +300,7 @@
           <a:p>
             <a:fld id="{440F5B16-5030-4041-AFCD-B1436462769D}" type="datetimeFigureOut">
               <a:rPr lang="en-US" smtClean="0"/>
-              <a:t>6/8/15</a:t>
+              <a:t>6/10/15</a:t>
             </a:fld>
             <a:endParaRPr lang="en-US"/>
           </a:p>
@@ -470,7 +470,7 @@
           <a:p>
             <a:fld id="{440F5B16-5030-4041-AFCD-B1436462769D}" type="datetimeFigureOut">
               <a:rPr lang="en-US" smtClean="0"/>
-              <a:t>6/8/15</a:t>
+              <a:t>6/10/15</a:t>
             </a:fld>
             <a:endParaRPr lang="en-US"/>
           </a:p>
@@ -650,7 +650,7 @@
           <a:p>
             <a:fld id="{440F5B16-5030-4041-AFCD-B1436462769D}" type="datetimeFigureOut">
               <a:rPr lang="en-US" smtClean="0"/>
-              <a:t>6/8/15</a:t>
+              <a:t>6/10/15</a:t>
             </a:fld>
             <a:endParaRPr lang="en-US"/>
           </a:p>
@@ -820,7 +820,7 @@
           <a:p>
             <a:fld id="{440F5B16-5030-4041-AFCD-B1436462769D}" type="datetimeFigureOut">
               <a:rPr lang="en-US" smtClean="0"/>
-              <a:t>6/8/15</a:t>
+              <a:t>6/10/15</a:t>
             </a:fld>
             <a:endParaRPr lang="en-US"/>
           </a:p>
@@ -1066,7 +1066,7 @@
           <a:p>
             <a:fld id="{440F5B16-5030-4041-AFCD-B1436462769D}" type="datetimeFigureOut">
               <a:rPr lang="en-US" smtClean="0"/>
-              <a:t>6/8/15</a:t>
+              <a:t>6/10/15</a:t>
             </a:fld>
             <a:endParaRPr lang="en-US"/>
           </a:p>
@@ -1354,7 +1354,7 @@
           <a:p>
             <a:fld id="{440F5B16-5030-4041-AFCD-B1436462769D}" type="datetimeFigureOut">
               <a:rPr lang="en-US" smtClean="0"/>
-              <a:t>6/8/15</a:t>
+              <a:t>6/10/15</a:t>
             </a:fld>
             <a:endParaRPr lang="en-US"/>
           </a:p>
@@ -1776,7 +1776,7 @@
           <a:p>
             <a:fld id="{440F5B16-5030-4041-AFCD-B1436462769D}" type="datetimeFigureOut">
               <a:rPr lang="en-US" smtClean="0"/>
-              <a:t>6/8/15</a:t>
+              <a:t>6/10/15</a:t>
             </a:fld>
             <a:endParaRPr lang="en-US"/>
           </a:p>
@@ -1894,7 +1894,7 @@
           <a:p>
             <a:fld id="{440F5B16-5030-4041-AFCD-B1436462769D}" type="datetimeFigureOut">
               <a:rPr lang="en-US" smtClean="0"/>
-              <a:t>6/8/15</a:t>
+              <a:t>6/10/15</a:t>
             </a:fld>
             <a:endParaRPr lang="en-US"/>
           </a:p>
@@ -1989,7 +1989,7 @@
           <a:p>
             <a:fld id="{440F5B16-5030-4041-AFCD-B1436462769D}" type="datetimeFigureOut">
               <a:rPr lang="en-US" smtClean="0"/>
-              <a:t>6/8/15</a:t>
+              <a:t>6/10/15</a:t>
             </a:fld>
             <a:endParaRPr lang="en-US"/>
           </a:p>
@@ -2266,7 +2266,7 @@
           <a:p>
             <a:fld id="{440F5B16-5030-4041-AFCD-B1436462769D}" type="datetimeFigureOut">
               <a:rPr lang="en-US" smtClean="0"/>
-              <a:t>6/8/15</a:t>
+              <a:t>6/10/15</a:t>
             </a:fld>
             <a:endParaRPr lang="en-US"/>
           </a:p>
@@ -2519,7 +2519,7 @@
           <a:p>
             <a:fld id="{440F5B16-5030-4041-AFCD-B1436462769D}" type="datetimeFigureOut">
               <a:rPr lang="en-US" smtClean="0"/>
-              <a:t>6/8/15</a:t>
+              <a:t>6/10/15</a:t>
             </a:fld>
             <a:endParaRPr lang="en-US"/>
           </a:p>
@@ -2732,7 +2732,7 @@
           <a:p>
             <a:fld id="{440F5B16-5030-4041-AFCD-B1436462769D}" type="datetimeFigureOut">
               <a:rPr lang="en-US" smtClean="0"/>
-              <a:t>6/8/15</a:t>
+              <a:t>6/10/15</a:t>
             </a:fld>
             <a:endParaRPr lang="en-US"/>
           </a:p>
@@ -3115,14 +3115,16 @@
         </p:nvSpPr>
         <p:spPr>
           <a:xfrm>
-            <a:off x="-57728" y="-65698"/>
+            <a:off x="0" y="0"/>
             <a:ext cx="9144000" cy="6858000"/>
           </a:xfrm>
           <a:prstGeom prst="rect">
             <a:avLst/>
           </a:prstGeom>
           <a:ln>
-            <a:noFill/>
+            <a:solidFill>
+              <a:srgbClr val="0000FF"/>
+            </a:solidFill>
           </a:ln>
         </p:spPr>
         <p:style>
@@ -3295,16 +3297,16 @@
       </p:sp>
       <p:grpSp>
         <p:nvGrpSpPr>
-          <p:cNvPr id="9" name="Group 8"/>
+          <p:cNvPr id="8" name="Group 7"/>
           <p:cNvGrpSpPr/>
           <p:nvPr/>
         </p:nvGrpSpPr>
         <p:grpSpPr>
           <a:xfrm>
-            <a:off x="1287632" y="3439594"/>
-            <a:ext cx="6484768" cy="830997"/>
-            <a:chOff x="823111" y="1269050"/>
-            <a:chExt cx="6484768" cy="830997"/>
+            <a:off x="2203535" y="3447974"/>
+            <a:ext cx="4261203" cy="830997"/>
+            <a:chOff x="2203535" y="3447974"/>
+            <a:chExt cx="4261203" cy="830997"/>
           </a:xfrm>
         </p:grpSpPr>
         <p:sp>
@@ -3315,70 +3317,80 @@
           </p:nvSpPr>
           <p:spPr>
             <a:xfrm>
-              <a:off x="823111" y="1269050"/>
-              <a:ext cx="6484768" cy="830997"/>
+              <a:off x="2203535" y="3447974"/>
+              <a:ext cx="4261203" cy="830997"/>
             </a:xfrm>
             <a:prstGeom prst="rect">
               <a:avLst/>
             </a:prstGeom>
             <a:noFill/>
+            <a:ln>
+              <a:noFill/>
+            </a:ln>
+            <a:scene3d>
+              <a:camera prst="orthographicFront"/>
+              <a:lightRig rig="flat" dir="tl">
+                <a:rot lat="0" lon="0" rev="6600000"/>
+              </a:lightRig>
+            </a:scene3d>
+            <a:sp3d>
+              <a:bevelT/>
+            </a:sp3d>
           </p:spPr>
           <p:txBody>
             <a:bodyPr wrap="none" rtlCol="0">
               <a:spAutoFit/>
-              <a:scene3d>
-                <a:camera prst="orthographicFront"/>
-                <a:lightRig rig="balanced" dir="t">
-                  <a:rot lat="0" lon="0" rev="2100000"/>
-                </a:lightRig>
-              </a:scene3d>
-              <a:sp3d extrusionH="57150" prstMaterial="metal">
-                <a:bevelT w="38100" h="25400"/>
-                <a:contourClr>
-                  <a:schemeClr val="bg2"/>
-                </a:contourClr>
-              </a:sp3d>
             </a:bodyPr>
             <a:lstStyle/>
             <a:p>
               <a:r>
-                <a:rPr lang="en-US" sz="4800" b="1" dirty="0" smtClean="0">
-                  <a:ln w="50800"/>
-                  <a:solidFill>
-                    <a:srgbClr val="008000"/>
-                  </a:solidFill>
+                <a:rPr lang="en-US" sz="4800" b="1" dirty="0" err="1" smtClean="0">
+                  <a:ln w="1905"/>
+                  <a:solidFill>
+                    <a:srgbClr val="0000FF"/>
+                  </a:solidFill>
+                  <a:effectLst>
+                    <a:innerShdw blurRad="69850" dist="43180" dir="5400000">
+                      <a:srgbClr val="000000">
+                        <a:alpha val="65000"/>
+                      </a:srgbClr>
+                    </a:innerShdw>
+                  </a:effectLst>
                   <a:latin typeface="Menlo Regular"/>
                   <a:cs typeface="Menlo Regular"/>
                 </a:rPr>
-                <a:t>High P </a:t>
+                <a:t>TennisGr</a:t>
               </a:r>
               <a:r>
-                <a:rPr lang="en-US" sz="4800" b="1" dirty="0" err="1" smtClean="0">
-                  <a:ln w="50800"/>
-                  <a:solidFill>
-                    <a:srgbClr val="008000"/>
-                  </a:solidFill>
+                <a:rPr lang="en-US" sz="4800" b="1" dirty="0" smtClean="0">
+                  <a:ln w="1905"/>
+                  <a:solidFill>
+                    <a:srgbClr val="0000FF"/>
+                  </a:solidFill>
+                  <a:effectLst>
+                    <a:innerShdw blurRad="69850" dist="43180" dir="5400000">
+                      <a:srgbClr val="000000">
+                        <a:alpha val="65000"/>
+                      </a:srgbClr>
+                    </a:innerShdw>
+                  </a:effectLst>
                   <a:latin typeface="Menlo Regular"/>
                   <a:cs typeface="Menlo Regular"/>
                 </a:rPr>
-                <a:t>int</a:t>
-              </a:r>
-              <a:r>
-                <a:rPr lang="en-US" sz="4800" b="1" dirty="0" smtClean="0">
-                  <a:ln w="50800"/>
-                  <a:solidFill>
-                    <a:srgbClr val="008000"/>
-                  </a:solidFill>
-                  <a:latin typeface="Menlo Regular"/>
-                  <a:cs typeface="Menlo Regular"/>
-                </a:rPr>
-                <a:t> Tennis</a:t>
+                <a:t> up</a:t>
               </a:r>
               <a:endParaRPr lang="en-US" sz="4800" b="1" dirty="0">
-                <a:ln w="50800"/>
+                <a:ln w="1905"/>
                 <a:solidFill>
-                  <a:srgbClr val="008000"/>
+                  <a:srgbClr val="0000FF"/>
                 </a:solidFill>
+                <a:effectLst>
+                  <a:innerShdw blurRad="69850" dist="43180" dir="5400000">
+                    <a:srgbClr val="000000">
+                      <a:alpha val="65000"/>
+                    </a:srgbClr>
+                  </a:innerShdw>
+                </a:effectLst>
                 <a:latin typeface="Menlo Regular"/>
                 <a:cs typeface="Menlo Regular"/>
               </a:endParaRPr>
@@ -3387,7 +3399,7 @@
         </p:sp>
         <p:pic>
           <p:nvPicPr>
-            <p:cNvPr id="7" name="Picture 6" descr="tennis_ball.png"/>
+            <p:cNvPr id="6" name="Picture 5" descr="tennisball_blue.png"/>
             <p:cNvPicPr>
               <a:picLocks noChangeAspect="1"/>
             </p:cNvPicPr>
@@ -3406,9 +3418,9 @@
             </a:stretch>
           </p:blipFill>
           <p:spPr>
-            <a:xfrm>
-              <a:off x="3121835" y="1565074"/>
-              <a:ext cx="381612" cy="390809"/>
+            <a:xfrm flipV="1">
+              <a:off x="5193363" y="3725748"/>
+              <a:ext cx="416270" cy="416270"/>
             </a:xfrm>
             <a:prstGeom prst="rect">
               <a:avLst/>

</xml_diff>